<commit_message>
Session affinity tutorial (#682)
* Session affinity tutorial

* Updated session affinity and other  tutorials

* sleep in e2e test after port-forward

* e2e test 5 second sleep after port-forward

* -n default flag in experiment promotion

* Updated md files

* Default namespace for routing-rule

* quick start success

* Cleaned up e2etest.sh

* reduced duration of test
</commit_message>
<xml_diff>
--- a/mkdocs/docs/images/src/canary-iter8-process.pptx
+++ b/mkdocs/docs/images/src/canary-iter8-process.pptx
@@ -197,7 +197,7 @@
           <a:p>
             <a:fld id="{38B78CBE-37FA-D241-BB4C-CAC5D3B25F49}" type="datetimeFigureOut">
               <a:rPr lang="en-US" smtClean="0"/>
-              <a:t>5/5/21</a:t>
+              <a:t>5/18/21</a:t>
             </a:fld>
             <a:endParaRPr lang="en-US"/>
           </a:p>
@@ -611,7 +611,7 @@
           <a:p>
             <a:fld id="{708812C5-0212-FD42-A0D4-E2E8FF4E3AF5}" type="datetime1">
               <a:rPr lang="en-US" smtClean="0"/>
-              <a:t>5/5/21</a:t>
+              <a:t>5/18/21</a:t>
             </a:fld>
             <a:endParaRPr lang="en-US"/>
           </a:p>
@@ -812,7 +812,7 @@
           <a:p>
             <a:fld id="{D232AC6F-41C3-B34B-9BAA-03ED2F3BC0F6}" type="datetime1">
               <a:rPr lang="en-US" smtClean="0"/>
-              <a:t>5/5/21</a:t>
+              <a:t>5/18/21</a:t>
             </a:fld>
             <a:endParaRPr lang="en-US"/>
           </a:p>
@@ -1023,7 +1023,7 @@
           <a:p>
             <a:fld id="{BEE140C2-F440-9D49-95CB-5965D64CC4A2}" type="datetime1">
               <a:rPr lang="en-US" smtClean="0"/>
-              <a:t>5/5/21</a:t>
+              <a:t>5/18/21</a:t>
             </a:fld>
             <a:endParaRPr lang="en-US"/>
           </a:p>
@@ -1224,7 +1224,7 @@
           <a:p>
             <a:fld id="{CC99F980-FB29-FD47-8508-150F73F1E8B0}" type="datetime1">
               <a:rPr lang="en-US" smtClean="0"/>
-              <a:t>5/5/21</a:t>
+              <a:t>5/18/21</a:t>
             </a:fld>
             <a:endParaRPr lang="en-US"/>
           </a:p>
@@ -1502,7 +1502,7 @@
           <a:p>
             <a:fld id="{D4510983-EA22-9643-8AC0-B3C6499B643B}" type="datetime1">
               <a:rPr lang="en-US" smtClean="0"/>
-              <a:t>5/5/21</a:t>
+              <a:t>5/18/21</a:t>
             </a:fld>
             <a:endParaRPr lang="en-US"/>
           </a:p>
@@ -1770,7 +1770,7 @@
           <a:p>
             <a:fld id="{D5A39195-967D-5D4E-8C6A-C99866996458}" type="datetime1">
               <a:rPr lang="en-US" smtClean="0"/>
-              <a:t>5/5/21</a:t>
+              <a:t>5/18/21</a:t>
             </a:fld>
             <a:endParaRPr lang="en-US"/>
           </a:p>
@@ -2185,7 +2185,7 @@
           <a:p>
             <a:fld id="{5AD771E9-C79D-684D-A158-5EB6E92DE947}" type="datetime1">
               <a:rPr lang="en-US" smtClean="0"/>
-              <a:t>5/5/21</a:t>
+              <a:t>5/18/21</a:t>
             </a:fld>
             <a:endParaRPr lang="en-US"/>
           </a:p>
@@ -2329,7 +2329,7 @@
           <a:p>
             <a:fld id="{693CA161-7E4C-5C4B-B799-DB602A0B9806}" type="datetime1">
               <a:rPr lang="en-US" smtClean="0"/>
-              <a:t>5/5/21</a:t>
+              <a:t>5/18/21</a:t>
             </a:fld>
             <a:endParaRPr lang="en-US"/>
           </a:p>
@@ -2445,7 +2445,7 @@
           <a:p>
             <a:fld id="{6D55FDF3-8BB2-6349-A5FA-057F3D78953D}" type="datetime1">
               <a:rPr lang="en-US" smtClean="0"/>
-              <a:t>5/5/21</a:t>
+              <a:t>5/18/21</a:t>
             </a:fld>
             <a:endParaRPr lang="en-US"/>
           </a:p>
@@ -2759,7 +2759,7 @@
           <a:p>
             <a:fld id="{EEDFACC0-3228-BA4B-942E-CEF38B0101FD}" type="datetime1">
               <a:rPr lang="en-US" smtClean="0"/>
-              <a:t>5/5/21</a:t>
+              <a:t>5/18/21</a:t>
             </a:fld>
             <a:endParaRPr lang="en-US"/>
           </a:p>
@@ -3050,7 +3050,7 @@
           <a:p>
             <a:fld id="{07EEEDBE-E24C-D140-B419-6D8D592D0F1C}" type="datetime1">
               <a:rPr lang="en-US" smtClean="0"/>
-              <a:t>5/5/21</a:t>
+              <a:t>5/18/21</a:t>
             </a:fld>
             <a:endParaRPr lang="en-US"/>
           </a:p>
@@ -3294,7 +3294,7 @@
           <a:p>
             <a:fld id="{E05781A2-A5EF-C54C-A3EF-F62483D37EDC}" type="datetime1">
               <a:rPr lang="en-US" smtClean="0"/>
-              <a:t>5/5/21</a:t>
+              <a:t>5/18/21</a:t>
             </a:fld>
             <a:endParaRPr lang="en-US"/>
           </a:p>
@@ -3729,8 +3729,8 @@
         </p:nvSpPr>
         <p:spPr>
           <a:xfrm>
-            <a:off x="2104707" y="809298"/>
-            <a:ext cx="8111347" cy="3867806"/>
+            <a:off x="1145629" y="809297"/>
+            <a:ext cx="9070426" cy="4100651"/>
           </a:xfrm>
           <a:prstGeom prst="rect">
             <a:avLst/>
@@ -4658,63 +4658,6 @@
           </a:fontRef>
         </p:style>
       </p:cxnSp>
-      <p:sp>
-        <p:nvSpPr>
-          <p:cNvPr id="2" name="Footer Placeholder 1">
-            <a:extLst>
-              <a:ext uri="{FF2B5EF4-FFF2-40B4-BE49-F238E27FC236}">
-                <a16:creationId xmlns:a16="http://schemas.microsoft.com/office/drawing/2014/main" id="{EEE1E3D6-6339-4046-AC30-E97E4646FB94}"/>
-              </a:ext>
-            </a:extLst>
-          </p:cNvPr>
-          <p:cNvSpPr>
-            <a:spLocks noGrp="1"/>
-          </p:cNvSpPr>
-          <p:nvPr>
-            <p:ph type="ftr" sz="quarter" idx="11"/>
-          </p:nvPr>
-        </p:nvSpPr>
-        <p:spPr/>
-        <p:txBody>
-          <a:bodyPr/>
-          <a:lstStyle/>
-          <a:p>
-            <a:r>
-              <a:rPr lang="en-US"/>
-              <a:t>https://iter8.tools</a:t>
-            </a:r>
-          </a:p>
-        </p:txBody>
-      </p:sp>
-      <p:sp>
-        <p:nvSpPr>
-          <p:cNvPr id="4" name="Slide Number Placeholder 3">
-            <a:extLst>
-              <a:ext uri="{FF2B5EF4-FFF2-40B4-BE49-F238E27FC236}">
-                <a16:creationId xmlns:a16="http://schemas.microsoft.com/office/drawing/2014/main" id="{2AFCABC9-6DAD-6F4E-8CC7-AF3930765234}"/>
-              </a:ext>
-            </a:extLst>
-          </p:cNvPr>
-          <p:cNvSpPr>
-            <a:spLocks noGrp="1"/>
-          </p:cNvSpPr>
-          <p:nvPr>
-            <p:ph type="sldNum" sz="quarter" idx="12"/>
-          </p:nvPr>
-        </p:nvSpPr>
-        <p:spPr/>
-        <p:txBody>
-          <a:bodyPr/>
-          <a:lstStyle/>
-          <a:p>
-            <a:fld id="{B78E2DF1-CA0F-8745-8AE1-A3A61670CB1B}" type="slidenum">
-              <a:rPr lang="en-US" smtClean="0"/>
-              <a:t>1</a:t>
-            </a:fld>
-            <a:endParaRPr lang="en-US"/>
-          </a:p>
-        </p:txBody>
-      </p:sp>
       <p:sp>
         <p:nvSpPr>
           <p:cNvPr id="30" name="Rectangle 29">

</xml_diff>